<commit_message>
Manual Desafio1 versión final
</commit_message>
<xml_diff>
--- a/Desafio1 Hanna Klapkova.pptx
+++ b/Desafio1 Hanna Klapkova.pptx
@@ -14678,14 +14678,6 @@
               </a:rPr>
               <a:t>GitKraken</a:t>
             </a:r>
-            <a:r>
-              <a:rPr lang="es-ES" dirty="0" smtClean="0">
-                <a:solidFill>
-                  <a:schemeClr val="tx1"/>
-                </a:solidFill>
-              </a:rPr>
-              <a:t/>
-            </a:r>
             <a:br>
               <a:rPr lang="es-ES" dirty="0" smtClean="0">
                 <a:solidFill>
@@ -14989,14 +14981,6 @@
               </a:rPr>
               <a:t>GitKraken</a:t>
             </a:r>
-            <a:r>
-              <a:rPr lang="es-ES" dirty="0" smtClean="0">
-                <a:solidFill>
-                  <a:schemeClr val="tx1"/>
-                </a:solidFill>
-              </a:rPr>
-              <a:t/>
-            </a:r>
             <a:br>
               <a:rPr lang="es-ES" dirty="0" smtClean="0">
                 <a:solidFill>
@@ -15254,14 +15238,6 @@
               </a:rPr>
               <a:t>GitKraken</a:t>
             </a:r>
-            <a:r>
-              <a:rPr lang="es-ES" dirty="0" smtClean="0">
-                <a:solidFill>
-                  <a:schemeClr val="tx1"/>
-                </a:solidFill>
-              </a:rPr>
-              <a:t/>
-            </a:r>
             <a:br>
               <a:rPr lang="es-ES" dirty="0" smtClean="0">
                 <a:solidFill>
@@ -15512,14 +15488,6 @@
               </a:rPr>
               <a:t>GitKraken</a:t>
             </a:r>
-            <a:r>
-              <a:rPr lang="es-ES" dirty="0" smtClean="0">
-                <a:solidFill>
-                  <a:schemeClr val="tx1"/>
-                </a:solidFill>
-              </a:rPr>
-              <a:t/>
-            </a:r>
             <a:br>
               <a:rPr lang="es-ES" dirty="0" smtClean="0">
                 <a:solidFill>
@@ -15753,14 +15721,6 @@
               </a:rPr>
               <a:t>GitKraken</a:t>
             </a:r>
-            <a:r>
-              <a:rPr lang="es-ES" dirty="0" smtClean="0">
-                <a:solidFill>
-                  <a:schemeClr val="tx1"/>
-                </a:solidFill>
-              </a:rPr>
-              <a:t/>
-            </a:r>
             <a:br>
               <a:rPr lang="es-ES" dirty="0" smtClean="0">
                 <a:solidFill>
@@ -15976,14 +15936,6 @@
               </a:rPr>
               <a:t>GitKraken</a:t>
             </a:r>
-            <a:r>
-              <a:rPr lang="es-ES" dirty="0" smtClean="0">
-                <a:solidFill>
-                  <a:schemeClr val="tx1"/>
-                </a:solidFill>
-              </a:rPr>
-              <a:t/>
-            </a:r>
             <a:br>
               <a:rPr lang="es-ES" dirty="0" smtClean="0">
                 <a:solidFill>
@@ -16375,14 +16327,6 @@
               </a:rPr>
               <a:t>GitKraken</a:t>
             </a:r>
-            <a:r>
-              <a:rPr lang="es-ES" dirty="0" smtClean="0">
-                <a:solidFill>
-                  <a:schemeClr val="tx1"/>
-                </a:solidFill>
-              </a:rPr>
-              <a:t/>
-            </a:r>
             <a:br>
               <a:rPr lang="es-ES" dirty="0" smtClean="0">
                 <a:solidFill>
@@ -16606,14 +16550,6 @@
               </a:rPr>
               <a:t>GitKraken</a:t>
             </a:r>
-            <a:r>
-              <a:rPr lang="es-ES" dirty="0" smtClean="0">
-                <a:solidFill>
-                  <a:schemeClr val="tx1"/>
-                </a:solidFill>
-              </a:rPr>
-              <a:t/>
-            </a:r>
             <a:br>
               <a:rPr lang="es-ES" dirty="0" smtClean="0">
                 <a:solidFill>
@@ -16889,14 +16825,6 @@
               </a:rPr>
               <a:t>GitKraken</a:t>
             </a:r>
-            <a:r>
-              <a:rPr lang="es-ES" dirty="0" smtClean="0">
-                <a:solidFill>
-                  <a:schemeClr val="tx1"/>
-                </a:solidFill>
-              </a:rPr>
-              <a:t/>
-            </a:r>
             <a:br>
               <a:rPr lang="es-ES" dirty="0" smtClean="0">
                 <a:solidFill>
@@ -17150,14 +17078,6 @@
               </a:rPr>
               <a:t>GitKraken</a:t>
             </a:r>
-            <a:r>
-              <a:rPr lang="es-ES" dirty="0" smtClean="0">
-                <a:solidFill>
-                  <a:schemeClr val="tx1"/>
-                </a:solidFill>
-              </a:rPr>
-              <a:t/>
-            </a:r>
             <a:br>
               <a:rPr lang="es-ES" dirty="0" smtClean="0">
                 <a:solidFill>
@@ -17455,14 +17375,6 @@
               </a:rPr>
               <a:t>GitKraken</a:t>
             </a:r>
-            <a:r>
-              <a:rPr lang="es-ES" dirty="0" smtClean="0">
-                <a:solidFill>
-                  <a:schemeClr val="tx1"/>
-                </a:solidFill>
-              </a:rPr>
-              <a:t/>
-            </a:r>
             <a:br>
               <a:rPr lang="es-ES" dirty="0" smtClean="0">
                 <a:solidFill>
@@ -17716,14 +17628,6 @@
               </a:rPr>
               <a:t>GitKraken</a:t>
             </a:r>
-            <a:r>
-              <a:rPr lang="es-ES" dirty="0" smtClean="0">
-                <a:solidFill>
-                  <a:schemeClr val="tx1"/>
-                </a:solidFill>
-              </a:rPr>
-              <a:t/>
-            </a:r>
             <a:br>
               <a:rPr lang="es-ES" dirty="0" smtClean="0">
                 <a:solidFill>
@@ -17971,14 +17875,6 @@
               </a:rPr>
               <a:t>GitKraken</a:t>
             </a:r>
-            <a:r>
-              <a:rPr lang="es-ES" dirty="0" smtClean="0">
-                <a:solidFill>
-                  <a:schemeClr val="tx1"/>
-                </a:solidFill>
-              </a:rPr>
-              <a:t/>
-            </a:r>
             <a:br>
               <a:rPr lang="es-ES" dirty="0" smtClean="0">
                 <a:solidFill>
@@ -18284,14 +18180,6 @@
               </a:rPr>
               <a:t>GitKraken</a:t>
             </a:r>
-            <a:r>
-              <a:rPr lang="es-ES" dirty="0" smtClean="0">
-                <a:solidFill>
-                  <a:schemeClr val="tx1"/>
-                </a:solidFill>
-              </a:rPr>
-              <a:t/>
-            </a:r>
             <a:br>
               <a:rPr lang="es-ES" dirty="0" smtClean="0">
                 <a:solidFill>
@@ -18521,14 +18409,6 @@
               </a:rPr>
               <a:t>GitKraken</a:t>
             </a:r>
-            <a:r>
-              <a:rPr lang="es-ES" dirty="0" smtClean="0">
-                <a:solidFill>
-                  <a:schemeClr val="tx1"/>
-                </a:solidFill>
-              </a:rPr>
-              <a:t/>
-            </a:r>
             <a:br>
               <a:rPr lang="es-ES" dirty="0" smtClean="0">
                 <a:solidFill>
@@ -18764,14 +18644,6 @@
               </a:rPr>
               <a:t>Colaboración</a:t>
             </a:r>
-            <a:r>
-              <a:rPr lang="es-ES" dirty="0" smtClean="0">
-                <a:solidFill>
-                  <a:schemeClr val="tx1"/>
-                </a:solidFill>
-              </a:rPr>
-              <a:t/>
-            </a:r>
             <a:br>
               <a:rPr lang="es-ES" dirty="0" smtClean="0">
                 <a:solidFill>
@@ -19114,14 +18986,6 @@
               </a:rPr>
               <a:t>Colaboración</a:t>
             </a:r>
-            <a:r>
-              <a:rPr lang="es-ES" dirty="0" smtClean="0">
-                <a:solidFill>
-                  <a:schemeClr val="tx1"/>
-                </a:solidFill>
-              </a:rPr>
-              <a:t/>
-            </a:r>
             <a:br>
               <a:rPr lang="es-ES" dirty="0" smtClean="0">
                 <a:solidFill>
@@ -19378,14 +19242,6 @@
               </a:rPr>
               <a:t>Colaboración</a:t>
             </a:r>
-            <a:r>
-              <a:rPr lang="es-ES" dirty="0" smtClean="0">
-                <a:solidFill>
-                  <a:schemeClr val="tx1"/>
-                </a:solidFill>
-              </a:rPr>
-              <a:t/>
-            </a:r>
             <a:br>
               <a:rPr lang="es-ES" dirty="0" smtClean="0">
                 <a:solidFill>
@@ -19605,14 +19461,6 @@
               </a:rPr>
               <a:t>Colaboración</a:t>
             </a:r>
-            <a:r>
-              <a:rPr lang="es-ES" dirty="0" smtClean="0">
-                <a:solidFill>
-                  <a:schemeClr val="tx1"/>
-                </a:solidFill>
-              </a:rPr>
-              <a:t/>
-            </a:r>
             <a:br>
               <a:rPr lang="es-ES" dirty="0" smtClean="0">
                 <a:solidFill>
@@ -19856,14 +19704,6 @@
               </a:rPr>
               <a:t>Colaboración</a:t>
             </a:r>
-            <a:r>
-              <a:rPr lang="es-ES" dirty="0" smtClean="0">
-                <a:solidFill>
-                  <a:schemeClr val="tx1"/>
-                </a:solidFill>
-              </a:rPr>
-              <a:t/>
-            </a:r>
             <a:br>
               <a:rPr lang="es-ES" dirty="0" smtClean="0">
                 <a:solidFill>
@@ -20095,14 +19935,6 @@
               </a:rPr>
               <a:t>Colaboración</a:t>
             </a:r>
-            <a:r>
-              <a:rPr lang="es-ES" dirty="0" smtClean="0">
-                <a:solidFill>
-                  <a:schemeClr val="tx1"/>
-                </a:solidFill>
-              </a:rPr>
-              <a:t/>
-            </a:r>
             <a:br>
               <a:rPr lang="es-ES" dirty="0" smtClean="0">
                 <a:solidFill>
@@ -20344,14 +20176,6 @@
               </a:rPr>
               <a:t>Bibliografía</a:t>
             </a:r>
-            <a:r>
-              <a:rPr lang="es-ES" dirty="0" smtClean="0">
-                <a:solidFill>
-                  <a:schemeClr val="tx1"/>
-                </a:solidFill>
-              </a:rPr>
-              <a:t/>
-            </a:r>
             <a:br>
               <a:rPr lang="es-ES" dirty="0" smtClean="0">
                 <a:solidFill>
@@ -20468,6 +20292,66 @@
               <a:buNone/>
             </a:pPr>
             <a:endParaRPr lang="es-ES" sz="3200" dirty="0" smtClean="0"/>
+          </a:p>
+          <a:p>
+            <a:pPr marL="0" indent="0">
+              <a:buNone/>
+            </a:pPr>
+            <a:r>
+              <a:rPr lang="es-ES" sz="3200" dirty="0">
+                <a:hlinkClick r:id="rId2"/>
+              </a:rPr>
+              <a:t>https://</a:t>
+            </a:r>
+            <a:r>
+              <a:rPr lang="es-ES" sz="3200" dirty="0" smtClean="0">
+                <a:hlinkClick r:id="rId2"/>
+              </a:rPr>
+              <a:t>www.youtube.com/watch?v=8WBJ7Ehr3-U</a:t>
+            </a:r>
+            <a:endParaRPr lang="es-ES" sz="3200" dirty="0" smtClean="0"/>
+          </a:p>
+          <a:p>
+            <a:pPr marL="0" indent="0">
+              <a:buNone/>
+            </a:pPr>
+            <a:r>
+              <a:rPr lang="es-ES" sz="3200" dirty="0">
+                <a:hlinkClick r:id="rId3"/>
+              </a:rPr>
+              <a:t>https://</a:t>
+            </a:r>
+            <a:r>
+              <a:rPr lang="es-ES" sz="3200" dirty="0" smtClean="0">
+                <a:hlinkClick r:id="rId3"/>
+              </a:rPr>
+              <a:t>www.youtube.com/watch?v=HiXLkL42tMU&amp;vl=es-419</a:t>
+            </a:r>
+            <a:endParaRPr lang="es-ES" sz="3200" dirty="0" smtClean="0"/>
+          </a:p>
+          <a:p>
+            <a:pPr marL="0" indent="0">
+              <a:buNone/>
+            </a:pPr>
+            <a:r>
+              <a:rPr lang="en-US" sz="3200">
+                <a:hlinkClick r:id="rId4"/>
+              </a:rPr>
+              <a:t>https</a:t>
+            </a:r>
+            <a:r>
+              <a:rPr lang="en-US" sz="3200">
+                <a:hlinkClick r:id="rId4"/>
+              </a:rPr>
+              <a:t>://</a:t>
+            </a:r>
+            <a:r>
+              <a:rPr lang="en-US" sz="3200" smtClean="0">
+                <a:hlinkClick r:id="rId4"/>
+              </a:rPr>
+              <a:t>www.youtube.com/watch?v=f0y_xCeM1Rk</a:t>
+            </a:r>
+            <a:endParaRPr lang="en-US" sz="3200" smtClean="0"/>
           </a:p>
           <a:p>
             <a:pPr marL="0" indent="0">

</xml_diff>